<commit_message>
Dec 19 2024 14:39
</commit_message>
<xml_diff>
--- a/Pandecta Logo.pptx
+++ b/Pandecta Logo.pptx
@@ -17,6 +17,7 @@
     <p:sldId id="265" r:id="rId11"/>
     <p:sldId id="266" r:id="rId12"/>
     <p:sldId id="267" r:id="rId13"/>
+    <p:sldId id="268" r:id="rId14"/>
   </p:sldIdLst>
   <p:sldSz cx="12192000" cy="6858000"/>
   <p:notesSz cx="6858000" cy="9144000"/>
@@ -126,7 +127,7 @@
 <file path=ppt/revisionInfo.xml><?xml version="1.0" encoding="utf-8"?>
 <p1510:revInfo xmlns:a="http://schemas.openxmlformats.org/drawingml/2006/main" xmlns:r="http://schemas.openxmlformats.org/officeDocument/2006/relationships" xmlns:p1510="http://schemas.microsoft.com/office/powerpoint/2015/10/main">
   <p1510:revLst>
-    <p1510:client id="{EAA9CB8D-51A7-4023-9954-B5D3A58F8F16}" v="14" dt="2024-06-18T14:22:52.737"/>
+    <p1510:client id="{6A840418-5776-4DD4-9C11-E05205A70FA4}" v="7" dt="2024-11-22T15:44:48.347"/>
   </p1510:revLst>
 </p1510:revInfo>
 </file>
@@ -392,6 +393,76 @@
             <ac:cxnSpMk id="10" creationId="{5BEFE6B0-0A70-1241-5D00-544EA014E072}"/>
           </ac:cxnSpMkLst>
         </pc:cxnChg>
+      </pc:sldChg>
+    </pc:docChg>
+  </pc:docChgLst>
+  <pc:docChgLst>
+    <pc:chgData name="Uros Kuzmanov" userId="9dea3f15909c750c" providerId="LiveId" clId="{6A840418-5776-4DD4-9C11-E05205A70FA4}"/>
+    <pc:docChg chg="undo custSel addSld modSld">
+      <pc:chgData name="Uros Kuzmanov" userId="9dea3f15909c750c" providerId="LiveId" clId="{6A840418-5776-4DD4-9C11-E05205A70FA4}" dt="2024-11-22T16:03:22.647" v="93" actId="680"/>
+      <pc:docMkLst>
+        <pc:docMk/>
+      </pc:docMkLst>
+      <pc:sldChg chg="addSp modSp mod">
+        <pc:chgData name="Uros Kuzmanov" userId="9dea3f15909c750c" providerId="LiveId" clId="{6A840418-5776-4DD4-9C11-E05205A70FA4}" dt="2024-11-22T15:47:15.529" v="91" actId="207"/>
+        <pc:sldMkLst>
+          <pc:docMk/>
+          <pc:sldMk cId="3522169585" sldId="262"/>
+        </pc:sldMkLst>
+        <pc:picChg chg="add mod">
+          <ac:chgData name="Uros Kuzmanov" userId="9dea3f15909c750c" providerId="LiveId" clId="{6A840418-5776-4DD4-9C11-E05205A70FA4}" dt="2024-11-22T15:47:15.529" v="91" actId="207"/>
+          <ac:picMkLst>
+            <pc:docMk/>
+            <pc:sldMk cId="3522169585" sldId="262"/>
+            <ac:picMk id="11" creationId="{6377DE27-66D3-8825-E32F-CC7F5A672B00}"/>
+          </ac:picMkLst>
+        </pc:picChg>
+      </pc:sldChg>
+      <pc:sldChg chg="addSp delSp modSp mod">
+        <pc:chgData name="Uros Kuzmanov" userId="9dea3f15909c750c" providerId="LiveId" clId="{6A840418-5776-4DD4-9C11-E05205A70FA4}" dt="2024-11-22T15:47:31.275" v="92" actId="207"/>
+        <pc:sldMkLst>
+          <pc:docMk/>
+          <pc:sldMk cId="1557173972" sldId="267"/>
+        </pc:sldMkLst>
+        <pc:grpChg chg="mod">
+          <ac:chgData name="Uros Kuzmanov" userId="9dea3f15909c750c" providerId="LiveId" clId="{6A840418-5776-4DD4-9C11-E05205A70FA4}" dt="2024-11-22T15:41:53.096" v="3" actId="1076"/>
+          <ac:grpSpMkLst>
+            <pc:docMk/>
+            <pc:sldMk cId="1557173972" sldId="267"/>
+            <ac:grpSpMk id="11" creationId="{EBEA597A-F1EB-F40D-C62D-5A72062AB23A}"/>
+          </ac:grpSpMkLst>
+        </pc:grpChg>
+        <pc:picChg chg="add mod">
+          <ac:chgData name="Uros Kuzmanov" userId="9dea3f15909c750c" providerId="LiveId" clId="{6A840418-5776-4DD4-9C11-E05205A70FA4}" dt="2024-11-22T15:47:31.275" v="92" actId="207"/>
+          <ac:picMkLst>
+            <pc:docMk/>
+            <pc:sldMk cId="1557173972" sldId="267"/>
+            <ac:picMk id="13" creationId="{C4341EC2-7B95-8F14-3877-32E2785142B9}"/>
+          </ac:picMkLst>
+        </pc:picChg>
+        <pc:picChg chg="add del mod">
+          <ac:chgData name="Uros Kuzmanov" userId="9dea3f15909c750c" providerId="LiveId" clId="{6A840418-5776-4DD4-9C11-E05205A70FA4}" dt="2024-11-22T15:43:40.728" v="13" actId="478"/>
+          <ac:picMkLst>
+            <pc:docMk/>
+            <pc:sldMk cId="1557173972" sldId="267"/>
+            <ac:picMk id="14" creationId="{581B6AD4-817B-3C66-25DE-E0716D91968A}"/>
+          </ac:picMkLst>
+        </pc:picChg>
+        <pc:picChg chg="add del mod">
+          <ac:chgData name="Uros Kuzmanov" userId="9dea3f15909c750c" providerId="LiveId" clId="{6A840418-5776-4DD4-9C11-E05205A70FA4}" dt="2024-11-22T15:44:43.390" v="30" actId="21"/>
+          <ac:picMkLst>
+            <pc:docMk/>
+            <pc:sldMk cId="1557173972" sldId="267"/>
+            <ac:picMk id="15" creationId="{A7A3DFC9-BCFA-5D16-D521-7A3286EBC8D0}"/>
+          </ac:picMkLst>
+        </pc:picChg>
+      </pc:sldChg>
+      <pc:sldChg chg="new">
+        <pc:chgData name="Uros Kuzmanov" userId="9dea3f15909c750c" providerId="LiveId" clId="{6A840418-5776-4DD4-9C11-E05205A70FA4}" dt="2024-11-22T16:03:22.647" v="93" actId="680"/>
+        <pc:sldMkLst>
+          <pc:docMk/>
+          <pc:sldMk cId="2997407261" sldId="268"/>
+        </pc:sldMkLst>
       </pc:sldChg>
     </pc:docChg>
   </pc:docChgLst>
@@ -1619,7 +1690,7 @@
           <a:p>
             <a:fld id="{3049AE66-483B-45C0-BA88-1D3C87F66297}" type="datetimeFigureOut">
               <a:rPr lang="en-CA" smtClean="0"/>
-              <a:t>2024-06-18</a:t>
+              <a:t>2024-11-22</a:t>
             </a:fld>
             <a:endParaRPr lang="en-CA"/>
           </a:p>
@@ -1819,7 +1890,7 @@
           <a:p>
             <a:fld id="{3049AE66-483B-45C0-BA88-1D3C87F66297}" type="datetimeFigureOut">
               <a:rPr lang="en-CA" smtClean="0"/>
-              <a:t>2024-06-18</a:t>
+              <a:t>2024-11-22</a:t>
             </a:fld>
             <a:endParaRPr lang="en-CA"/>
           </a:p>
@@ -2029,7 +2100,7 @@
           <a:p>
             <a:fld id="{3049AE66-483B-45C0-BA88-1D3C87F66297}" type="datetimeFigureOut">
               <a:rPr lang="en-CA" smtClean="0"/>
-              <a:t>2024-06-18</a:t>
+              <a:t>2024-11-22</a:t>
             </a:fld>
             <a:endParaRPr lang="en-CA"/>
           </a:p>
@@ -2229,7 +2300,7 @@
           <a:p>
             <a:fld id="{3049AE66-483B-45C0-BA88-1D3C87F66297}" type="datetimeFigureOut">
               <a:rPr lang="en-CA" smtClean="0"/>
-              <a:t>2024-06-18</a:t>
+              <a:t>2024-11-22</a:t>
             </a:fld>
             <a:endParaRPr lang="en-CA"/>
           </a:p>
@@ -2505,7 +2576,7 @@
           <a:p>
             <a:fld id="{3049AE66-483B-45C0-BA88-1D3C87F66297}" type="datetimeFigureOut">
               <a:rPr lang="en-CA" smtClean="0"/>
-              <a:t>2024-06-18</a:t>
+              <a:t>2024-11-22</a:t>
             </a:fld>
             <a:endParaRPr lang="en-CA"/>
           </a:p>
@@ -2773,7 +2844,7 @@
           <a:p>
             <a:fld id="{3049AE66-483B-45C0-BA88-1D3C87F66297}" type="datetimeFigureOut">
               <a:rPr lang="en-CA" smtClean="0"/>
-              <a:t>2024-06-18</a:t>
+              <a:t>2024-11-22</a:t>
             </a:fld>
             <a:endParaRPr lang="en-CA"/>
           </a:p>
@@ -3188,7 +3259,7 @@
           <a:p>
             <a:fld id="{3049AE66-483B-45C0-BA88-1D3C87F66297}" type="datetimeFigureOut">
               <a:rPr lang="en-CA" smtClean="0"/>
-              <a:t>2024-06-18</a:t>
+              <a:t>2024-11-22</a:t>
             </a:fld>
             <a:endParaRPr lang="en-CA"/>
           </a:p>
@@ -3330,7 +3401,7 @@
           <a:p>
             <a:fld id="{3049AE66-483B-45C0-BA88-1D3C87F66297}" type="datetimeFigureOut">
               <a:rPr lang="en-CA" smtClean="0"/>
-              <a:t>2024-06-18</a:t>
+              <a:t>2024-11-22</a:t>
             </a:fld>
             <a:endParaRPr lang="en-CA"/>
           </a:p>
@@ -3443,7 +3514,7 @@
           <a:p>
             <a:fld id="{3049AE66-483B-45C0-BA88-1D3C87F66297}" type="datetimeFigureOut">
               <a:rPr lang="en-CA" smtClean="0"/>
-              <a:t>2024-06-18</a:t>
+              <a:t>2024-11-22</a:t>
             </a:fld>
             <a:endParaRPr lang="en-CA"/>
           </a:p>
@@ -3756,7 +3827,7 @@
           <a:p>
             <a:fld id="{3049AE66-483B-45C0-BA88-1D3C87F66297}" type="datetimeFigureOut">
               <a:rPr lang="en-CA" smtClean="0"/>
-              <a:t>2024-06-18</a:t>
+              <a:t>2024-11-22</a:t>
             </a:fld>
             <a:endParaRPr lang="en-CA"/>
           </a:p>
@@ -4045,7 +4116,7 @@
           <a:p>
             <a:fld id="{3049AE66-483B-45C0-BA88-1D3C87F66297}" type="datetimeFigureOut">
               <a:rPr lang="en-CA" smtClean="0"/>
-              <a:t>2024-06-18</a:t>
+              <a:t>2024-11-22</a:t>
             </a:fld>
             <a:endParaRPr lang="en-CA"/>
           </a:p>
@@ -4288,7 +4359,7 @@
           <a:p>
             <a:fld id="{3049AE66-483B-45C0-BA88-1D3C87F66297}" type="datetimeFigureOut">
               <a:rPr lang="en-CA" smtClean="0"/>
-              <a:t>2024-06-18</a:t>
+              <a:t>2024-11-22</a:t>
             </a:fld>
             <a:endParaRPr lang="en-CA"/>
           </a:p>
@@ -7244,7 +7315,7 @@
         </p:nvGrpSpPr>
         <p:grpSpPr>
           <a:xfrm>
-            <a:off x="4016821" y="1173681"/>
+            <a:off x="4506939" y="1437029"/>
             <a:ext cx="3814352" cy="4723401"/>
             <a:chOff x="4016821" y="1173681"/>
             <a:chExt cx="3814352" cy="4723401"/>
@@ -7914,10 +7985,126 @@
           </p:sp>
         </p:grpSp>
       </p:grpSp>
+      <p:pic>
+        <p:nvPicPr>
+          <p:cNvPr id="13" name="Graphic 12" descr="Badge Tm outline">
+            <a:extLst>
+              <a:ext uri="{FF2B5EF4-FFF2-40B4-BE49-F238E27FC236}">
+                <a16:creationId xmlns:a16="http://schemas.microsoft.com/office/drawing/2014/main" id="{C4341EC2-7B95-8F14-3877-32E2785142B9}"/>
+              </a:ext>
+            </a:extLst>
+          </p:cNvPr>
+          <p:cNvPicPr>
+            <a:picLocks noChangeAspect="1"/>
+          </p:cNvPicPr>
+          <p:nvPr/>
+        </p:nvPicPr>
+        <p:blipFill>
+          <a:blip r:embed="rId2">
+            <a:extLst>
+              <a:ext uri="{96DAC541-7B7A-43D3-8B79-37D633B846F1}">
+                <asvg:svgBlip xmlns:asvg="http://schemas.microsoft.com/office/drawing/2016/SVG/main" r:embed="rId3"/>
+              </a:ext>
+            </a:extLst>
+          </a:blip>
+          <a:stretch>
+            <a:fillRect/>
+          </a:stretch>
+        </p:blipFill>
+        <p:spPr>
+          <a:xfrm>
+            <a:off x="7529291" y="5800430"/>
+            <a:ext cx="720000" cy="720000"/>
+          </a:xfrm>
+          <a:prstGeom prst="rect">
+            <a:avLst/>
+          </a:prstGeom>
+        </p:spPr>
+      </p:pic>
     </p:spTree>
     <p:extLst>
       <p:ext uri="{BB962C8B-B14F-4D97-AF65-F5344CB8AC3E}">
         <p14:creationId xmlns:p14="http://schemas.microsoft.com/office/powerpoint/2010/main" val="1557173972"/>
+      </p:ext>
+    </p:extLst>
+  </p:cSld>
+  <p:clrMapOvr>
+    <a:masterClrMapping/>
+  </p:clrMapOvr>
+</p:sld>
+</file>
+
+<file path=ppt/slides/slide13.xml><?xml version="1.0" encoding="utf-8"?>
+<p:sld xmlns:a="http://schemas.openxmlformats.org/drawingml/2006/main" xmlns:r="http://schemas.openxmlformats.org/officeDocument/2006/relationships" xmlns:p="http://schemas.openxmlformats.org/presentationml/2006/main">
+  <p:cSld>
+    <p:spTree>
+      <p:nvGrpSpPr>
+        <p:cNvPr id="1" name=""/>
+        <p:cNvGrpSpPr/>
+        <p:nvPr/>
+      </p:nvGrpSpPr>
+      <p:grpSpPr>
+        <a:xfrm>
+          <a:off x="0" y="0"/>
+          <a:ext cx="0" cy="0"/>
+          <a:chOff x="0" y="0"/>
+          <a:chExt cx="0" cy="0"/>
+        </a:xfrm>
+      </p:grpSpPr>
+      <p:sp>
+        <p:nvSpPr>
+          <p:cNvPr id="2" name="Title 1">
+            <a:extLst>
+              <a:ext uri="{FF2B5EF4-FFF2-40B4-BE49-F238E27FC236}">
+                <a16:creationId xmlns:a16="http://schemas.microsoft.com/office/drawing/2014/main" id="{7C41DFB9-1275-BB28-1AE5-40C507A2E7E0}"/>
+              </a:ext>
+            </a:extLst>
+          </p:cNvPr>
+          <p:cNvSpPr>
+            <a:spLocks noGrp="1"/>
+          </p:cNvSpPr>
+          <p:nvPr>
+            <p:ph type="title"/>
+          </p:nvPr>
+        </p:nvSpPr>
+        <p:spPr/>
+        <p:txBody>
+          <a:bodyPr/>
+          <a:lstStyle/>
+          <a:p>
+            <a:endParaRPr lang="en-CA"/>
+          </a:p>
+        </p:txBody>
+      </p:sp>
+      <p:sp>
+        <p:nvSpPr>
+          <p:cNvPr id="3" name="Content Placeholder 2">
+            <a:extLst>
+              <a:ext uri="{FF2B5EF4-FFF2-40B4-BE49-F238E27FC236}">
+                <a16:creationId xmlns:a16="http://schemas.microsoft.com/office/drawing/2014/main" id="{98CEF0E6-9D80-11CA-B5F3-CB2196E8C1A6}"/>
+              </a:ext>
+            </a:extLst>
+          </p:cNvPr>
+          <p:cNvSpPr>
+            <a:spLocks noGrp="1"/>
+          </p:cNvSpPr>
+          <p:nvPr>
+            <p:ph idx="1"/>
+          </p:nvPr>
+        </p:nvSpPr>
+        <p:spPr/>
+        <p:txBody>
+          <a:bodyPr/>
+          <a:lstStyle/>
+          <a:p>
+            <a:endParaRPr lang="en-CA"/>
+          </a:p>
+        </p:txBody>
+      </p:sp>
+    </p:spTree>
+    <p:extLst>
+      <p:ext uri="{BB962C8B-B14F-4D97-AF65-F5344CB8AC3E}">
+        <p14:creationId xmlns:p14="http://schemas.microsoft.com/office/powerpoint/2010/main" val="2997407261"/>
       </p:ext>
     </p:extLst>
   </p:cSld>
@@ -10896,6 +11083,42 @@
           </p:sp>
         </p:grpSp>
       </p:grpSp>
+      <p:pic>
+        <p:nvPicPr>
+          <p:cNvPr id="11" name="Graphic 10" descr="Badge Tm outline">
+            <a:extLst>
+              <a:ext uri="{FF2B5EF4-FFF2-40B4-BE49-F238E27FC236}">
+                <a16:creationId xmlns:a16="http://schemas.microsoft.com/office/drawing/2014/main" id="{6377DE27-66D3-8825-E32F-CC7F5A672B00}"/>
+              </a:ext>
+            </a:extLst>
+          </p:cNvPr>
+          <p:cNvPicPr>
+            <a:picLocks noChangeAspect="1"/>
+          </p:cNvPicPr>
+          <p:nvPr/>
+        </p:nvPicPr>
+        <p:blipFill>
+          <a:blip r:embed="rId2">
+            <a:extLst>
+              <a:ext uri="{96DAC541-7B7A-43D3-8B79-37D633B846F1}">
+                <asvg:svgBlip xmlns:asvg="http://schemas.microsoft.com/office/drawing/2016/SVG/main" r:embed="rId3"/>
+              </a:ext>
+            </a:extLst>
+          </a:blip>
+          <a:stretch>
+            <a:fillRect/>
+          </a:stretch>
+        </p:blipFill>
+        <p:spPr>
+          <a:xfrm>
+            <a:off x="7039173" y="5537083"/>
+            <a:ext cx="720000" cy="720000"/>
+          </a:xfrm>
+          <a:prstGeom prst="rect">
+            <a:avLst/>
+          </a:prstGeom>
+        </p:spPr>
+      </p:pic>
     </p:spTree>
     <p:extLst>
       <p:ext uri="{BB962C8B-B14F-4D97-AF65-F5344CB8AC3E}">

</xml_diff>